<commit_message>
mater, da sm ze blizu konca
</commit_message>
<xml_diff>
--- a/Predstavitev1.pptx
+++ b/Predstavitev1.pptx
@@ -6,6 +6,8 @@
   </p:sldMasterIdLst>
   <p:sldIdLst>
     <p:sldId id="256" r:id="rId2"/>
+    <p:sldId id="257" r:id="rId3"/>
+    <p:sldId id="258" r:id="rId4"/>
   </p:sldIdLst>
   <p:sldSz cx="12192000" cy="6858000"/>
   <p:notesSz cx="6858000" cy="9144000"/>
@@ -104,6 +106,11 @@
       </a:defRPr>
     </a:lvl9pPr>
   </p:defaultTextStyle>
+  <p:extLst>
+    <p:ext uri="{EFAFB233-063F-42B5-8137-9DF3F51BA10A}">
+      <p15:sldGuideLst xmlns:p15="http://schemas.microsoft.com/office/powerpoint/2012/main"/>
+    </p:ext>
+  </p:extLst>
 </p:presentation>
 </file>
 
@@ -238,7 +245,7 @@
           <a:p>
             <a:fld id="{EBC4D837-150B-4E1C-B756-DBD0B08A8E21}" type="datetimeFigureOut">
               <a:rPr lang="en-GB" smtClean="0"/>
-              <a:t>2019-12-25</a:t>
+              <a:t>2019-12-29</a:t>
             </a:fld>
             <a:endParaRPr lang="en-GB"/>
           </a:p>
@@ -408,7 +415,7 @@
           <a:p>
             <a:fld id="{EBC4D837-150B-4E1C-B756-DBD0B08A8E21}" type="datetimeFigureOut">
               <a:rPr lang="en-GB" smtClean="0"/>
-              <a:t>2019-12-25</a:t>
+              <a:t>2019-12-29</a:t>
             </a:fld>
             <a:endParaRPr lang="en-GB"/>
           </a:p>
@@ -588,7 +595,7 @@
           <a:p>
             <a:fld id="{EBC4D837-150B-4E1C-B756-DBD0B08A8E21}" type="datetimeFigureOut">
               <a:rPr lang="en-GB" smtClean="0"/>
-              <a:t>2019-12-25</a:t>
+              <a:t>2019-12-29</a:t>
             </a:fld>
             <a:endParaRPr lang="en-GB"/>
           </a:p>
@@ -758,7 +765,7 @@
           <a:p>
             <a:fld id="{EBC4D837-150B-4E1C-B756-DBD0B08A8E21}" type="datetimeFigureOut">
               <a:rPr lang="en-GB" smtClean="0"/>
-              <a:t>2019-12-25</a:t>
+              <a:t>2019-12-29</a:t>
             </a:fld>
             <a:endParaRPr lang="en-GB"/>
           </a:p>
@@ -1004,7 +1011,7 @@
           <a:p>
             <a:fld id="{EBC4D837-150B-4E1C-B756-DBD0B08A8E21}" type="datetimeFigureOut">
               <a:rPr lang="en-GB" smtClean="0"/>
-              <a:t>2019-12-25</a:t>
+              <a:t>2019-12-29</a:t>
             </a:fld>
             <a:endParaRPr lang="en-GB"/>
           </a:p>
@@ -1236,7 +1243,7 @@
           <a:p>
             <a:fld id="{EBC4D837-150B-4E1C-B756-DBD0B08A8E21}" type="datetimeFigureOut">
               <a:rPr lang="en-GB" smtClean="0"/>
-              <a:t>2019-12-25</a:t>
+              <a:t>2019-12-29</a:t>
             </a:fld>
             <a:endParaRPr lang="en-GB"/>
           </a:p>
@@ -1603,7 +1610,7 @@
           <a:p>
             <a:fld id="{EBC4D837-150B-4E1C-B756-DBD0B08A8E21}" type="datetimeFigureOut">
               <a:rPr lang="en-GB" smtClean="0"/>
-              <a:t>2019-12-25</a:t>
+              <a:t>2019-12-29</a:t>
             </a:fld>
             <a:endParaRPr lang="en-GB"/>
           </a:p>
@@ -1721,7 +1728,7 @@
           <a:p>
             <a:fld id="{EBC4D837-150B-4E1C-B756-DBD0B08A8E21}" type="datetimeFigureOut">
               <a:rPr lang="en-GB" smtClean="0"/>
-              <a:t>2019-12-25</a:t>
+              <a:t>2019-12-29</a:t>
             </a:fld>
             <a:endParaRPr lang="en-GB"/>
           </a:p>
@@ -1816,7 +1823,7 @@
           <a:p>
             <a:fld id="{EBC4D837-150B-4E1C-B756-DBD0B08A8E21}" type="datetimeFigureOut">
               <a:rPr lang="en-GB" smtClean="0"/>
-              <a:t>2019-12-25</a:t>
+              <a:t>2019-12-29</a:t>
             </a:fld>
             <a:endParaRPr lang="en-GB"/>
           </a:p>
@@ -2093,7 +2100,7 @@
           <a:p>
             <a:fld id="{EBC4D837-150B-4E1C-B756-DBD0B08A8E21}" type="datetimeFigureOut">
               <a:rPr lang="en-GB" smtClean="0"/>
-              <a:t>2019-12-25</a:t>
+              <a:t>2019-12-29</a:t>
             </a:fld>
             <a:endParaRPr lang="en-GB"/>
           </a:p>
@@ -2346,7 +2353,7 @@
           <a:p>
             <a:fld id="{EBC4D837-150B-4E1C-B756-DBD0B08A8E21}" type="datetimeFigureOut">
               <a:rPr lang="en-GB" smtClean="0"/>
-              <a:t>2019-12-25</a:t>
+              <a:t>2019-12-29</a:t>
             </a:fld>
             <a:endParaRPr lang="en-GB"/>
           </a:p>
@@ -2559,7 +2566,7 @@
           <a:p>
             <a:fld id="{EBC4D837-150B-4E1C-B756-DBD0B08A8E21}" type="datetimeFigureOut">
               <a:rPr lang="en-GB" smtClean="0"/>
-              <a:t>2019-12-25</a:t>
+              <a:t>2019-12-29</a:t>
             </a:fld>
             <a:endParaRPr lang="en-GB"/>
           </a:p>
@@ -3476,6 +3483,614 @@
 </p:sld>
 </file>
 
+<file path=ppt/slides/slide2.xml><?xml version="1.0" encoding="utf-8"?>
+<p:sld xmlns:a="http://schemas.openxmlformats.org/drawingml/2006/main" xmlns:r="http://schemas.openxmlformats.org/officeDocument/2006/relationships" xmlns:p="http://schemas.openxmlformats.org/presentationml/2006/main">
+  <p:cSld>
+    <p:spTree>
+      <p:nvGrpSpPr>
+        <p:cNvPr id="1" name=""/>
+        <p:cNvGrpSpPr/>
+        <p:nvPr/>
+      </p:nvGrpSpPr>
+      <p:grpSpPr>
+        <a:xfrm>
+          <a:off x="0" y="0"/>
+          <a:ext cx="0" cy="0"/>
+          <a:chOff x="0" y="0"/>
+          <a:chExt cx="0" cy="0"/>
+        </a:xfrm>
+      </p:grpSpPr>
+      <p:sp>
+        <p:nvSpPr>
+          <p:cNvPr id="4" name="Pravokotnik 3"/>
+          <p:cNvSpPr/>
+          <p:nvPr/>
+        </p:nvSpPr>
+        <p:spPr>
+          <a:xfrm>
+            <a:off x="0" y="0"/>
+            <a:ext cx="12192000" cy="6858000"/>
+          </a:xfrm>
+          <a:prstGeom prst="rect">
+            <a:avLst/>
+          </a:prstGeom>
+        </p:spPr>
+        <p:style>
+          <a:lnRef idx="2">
+            <a:schemeClr val="dk1">
+              <a:shade val="50000"/>
+            </a:schemeClr>
+          </a:lnRef>
+          <a:fillRef idx="1">
+            <a:schemeClr val="dk1"/>
+          </a:fillRef>
+          <a:effectRef idx="0">
+            <a:schemeClr val="dk1"/>
+          </a:effectRef>
+          <a:fontRef idx="minor">
+            <a:schemeClr val="lt1"/>
+          </a:fontRef>
+        </p:style>
+        <p:txBody>
+          <a:bodyPr rtlCol="0" anchor="ctr"/>
+          <a:lstStyle/>
+          <a:p>
+            <a:pPr algn="ctr"/>
+            <a:endParaRPr lang="en-GB" sz="4500" dirty="0"/>
+          </a:p>
+        </p:txBody>
+      </p:sp>
+      <p:sp>
+        <p:nvSpPr>
+          <p:cNvPr id="5" name="Pravokotnik 4"/>
+          <p:cNvSpPr/>
+          <p:nvPr/>
+        </p:nvSpPr>
+        <p:spPr>
+          <a:xfrm>
+            <a:off x="2693773" y="501477"/>
+            <a:ext cx="6804454" cy="1556952"/>
+          </a:xfrm>
+          <a:prstGeom prst="rect">
+            <a:avLst/>
+          </a:prstGeom>
+          <a:gradFill flip="none" rotWithShape="1">
+            <a:gsLst>
+              <a:gs pos="0">
+                <a:schemeClr val="accent5">
+                  <a:shade val="30000"/>
+                  <a:satMod val="115000"/>
+                </a:schemeClr>
+              </a:gs>
+              <a:gs pos="50000">
+                <a:schemeClr val="accent5">
+                  <a:shade val="67500"/>
+                  <a:satMod val="115000"/>
+                </a:schemeClr>
+              </a:gs>
+              <a:gs pos="100000">
+                <a:schemeClr val="accent5">
+                  <a:shade val="100000"/>
+                  <a:satMod val="115000"/>
+                </a:schemeClr>
+              </a:gs>
+            </a:gsLst>
+            <a:path path="circle">
+              <a:fillToRect l="50000" t="50000" r="50000" b="50000"/>
+            </a:path>
+            <a:tileRect/>
+          </a:gradFill>
+          <a:effectLst>
+            <a:glow rad="228600">
+              <a:schemeClr val="accent5">
+                <a:satMod val="175000"/>
+                <a:alpha val="40000"/>
+              </a:schemeClr>
+            </a:glow>
+          </a:effectLst>
+        </p:spPr>
+        <p:style>
+          <a:lnRef idx="2">
+            <a:schemeClr val="accent5">
+              <a:shade val="50000"/>
+            </a:schemeClr>
+          </a:lnRef>
+          <a:fillRef idx="1">
+            <a:schemeClr val="accent5"/>
+          </a:fillRef>
+          <a:effectRef idx="0">
+            <a:schemeClr val="accent5"/>
+          </a:effectRef>
+          <a:fontRef idx="minor">
+            <a:schemeClr val="lt1"/>
+          </a:fontRef>
+        </p:style>
+        <p:txBody>
+          <a:bodyPr rtlCol="0" anchor="ctr"/>
+          <a:lstStyle/>
+          <a:p>
+            <a:pPr algn="ctr"/>
+            <a:r>
+              <a:rPr lang="sl-SI" sz="4500" dirty="0" smtClean="0"/>
+              <a:t>IGRAJ</a:t>
+            </a:r>
+            <a:endParaRPr lang="en-GB" sz="4500" dirty="0"/>
+          </a:p>
+        </p:txBody>
+      </p:sp>
+      <p:sp>
+        <p:nvSpPr>
+          <p:cNvPr id="6" name="Pravokotnik 5"/>
+          <p:cNvSpPr/>
+          <p:nvPr/>
+        </p:nvSpPr>
+        <p:spPr>
+          <a:xfrm>
+            <a:off x="2693773" y="2650524"/>
+            <a:ext cx="6804454" cy="1556952"/>
+          </a:xfrm>
+          <a:prstGeom prst="rect">
+            <a:avLst/>
+          </a:prstGeom>
+          <a:gradFill flip="none" rotWithShape="1">
+            <a:gsLst>
+              <a:gs pos="0">
+                <a:schemeClr val="accent5">
+                  <a:shade val="30000"/>
+                  <a:satMod val="115000"/>
+                </a:schemeClr>
+              </a:gs>
+              <a:gs pos="50000">
+                <a:schemeClr val="accent5">
+                  <a:shade val="67500"/>
+                  <a:satMod val="115000"/>
+                </a:schemeClr>
+              </a:gs>
+              <a:gs pos="100000">
+                <a:schemeClr val="accent5">
+                  <a:shade val="100000"/>
+                  <a:satMod val="115000"/>
+                </a:schemeClr>
+              </a:gs>
+            </a:gsLst>
+            <a:path path="circle">
+              <a:fillToRect l="50000" t="50000" r="50000" b="50000"/>
+            </a:path>
+            <a:tileRect/>
+          </a:gradFill>
+          <a:effectLst>
+            <a:glow rad="228600">
+              <a:schemeClr val="accent5">
+                <a:satMod val="175000"/>
+                <a:alpha val="40000"/>
+              </a:schemeClr>
+            </a:glow>
+          </a:effectLst>
+        </p:spPr>
+        <p:style>
+          <a:lnRef idx="2">
+            <a:schemeClr val="accent5">
+              <a:shade val="50000"/>
+            </a:schemeClr>
+          </a:lnRef>
+          <a:fillRef idx="1">
+            <a:schemeClr val="accent5"/>
+          </a:fillRef>
+          <a:effectRef idx="0">
+            <a:schemeClr val="accent5"/>
+          </a:effectRef>
+          <a:fontRef idx="minor">
+            <a:schemeClr val="lt1"/>
+          </a:fontRef>
+        </p:style>
+        <p:txBody>
+          <a:bodyPr rtlCol="0" anchor="ctr"/>
+          <a:lstStyle/>
+          <a:p>
+            <a:pPr algn="ctr"/>
+            <a:r>
+              <a:rPr lang="sl-SI" sz="4500" dirty="0" smtClean="0"/>
+              <a:t>NASTAVITVE</a:t>
+            </a:r>
+            <a:endParaRPr lang="en-GB" sz="4500" dirty="0"/>
+          </a:p>
+        </p:txBody>
+      </p:sp>
+      <p:sp>
+        <p:nvSpPr>
+          <p:cNvPr id="7" name="Pravokotnik 6"/>
+          <p:cNvSpPr/>
+          <p:nvPr/>
+        </p:nvSpPr>
+        <p:spPr>
+          <a:xfrm>
+            <a:off x="2693773" y="4754262"/>
+            <a:ext cx="6804454" cy="1556952"/>
+          </a:xfrm>
+          <a:prstGeom prst="rect">
+            <a:avLst/>
+          </a:prstGeom>
+          <a:gradFill flip="none" rotWithShape="1">
+            <a:gsLst>
+              <a:gs pos="0">
+                <a:schemeClr val="accent5">
+                  <a:shade val="30000"/>
+                  <a:satMod val="115000"/>
+                </a:schemeClr>
+              </a:gs>
+              <a:gs pos="50000">
+                <a:schemeClr val="accent5">
+                  <a:shade val="67500"/>
+                  <a:satMod val="115000"/>
+                </a:schemeClr>
+              </a:gs>
+              <a:gs pos="100000">
+                <a:schemeClr val="accent5">
+                  <a:shade val="100000"/>
+                  <a:satMod val="115000"/>
+                </a:schemeClr>
+              </a:gs>
+            </a:gsLst>
+            <a:path path="circle">
+              <a:fillToRect l="50000" t="50000" r="50000" b="50000"/>
+            </a:path>
+            <a:tileRect/>
+          </a:gradFill>
+          <a:effectLst>
+            <a:glow rad="228600">
+              <a:schemeClr val="accent5">
+                <a:satMod val="175000"/>
+                <a:alpha val="40000"/>
+              </a:schemeClr>
+            </a:glow>
+          </a:effectLst>
+        </p:spPr>
+        <p:style>
+          <a:lnRef idx="2">
+            <a:schemeClr val="accent5">
+              <a:shade val="50000"/>
+            </a:schemeClr>
+          </a:lnRef>
+          <a:fillRef idx="1">
+            <a:schemeClr val="accent5"/>
+          </a:fillRef>
+          <a:effectRef idx="0">
+            <a:schemeClr val="accent5"/>
+          </a:effectRef>
+          <a:fontRef idx="minor">
+            <a:schemeClr val="lt1"/>
+          </a:fontRef>
+        </p:style>
+        <p:txBody>
+          <a:bodyPr rtlCol="0" anchor="ctr"/>
+          <a:lstStyle/>
+          <a:p>
+            <a:pPr algn="ctr"/>
+            <a:r>
+              <a:rPr lang="sl-SI" sz="4500" dirty="0" smtClean="0"/>
+              <a:t>KONEC</a:t>
+            </a:r>
+            <a:endParaRPr lang="en-GB" sz="4500" dirty="0"/>
+          </a:p>
+        </p:txBody>
+      </p:sp>
+    </p:spTree>
+    <p:extLst>
+      <p:ext uri="{BB962C8B-B14F-4D97-AF65-F5344CB8AC3E}">
+        <p14:creationId xmlns:p14="http://schemas.microsoft.com/office/powerpoint/2010/main" val="473044718"/>
+      </p:ext>
+    </p:extLst>
+  </p:cSld>
+  <p:clrMapOvr>
+    <a:masterClrMapping/>
+  </p:clrMapOvr>
+</p:sld>
+</file>
+
+<file path=ppt/slides/slide3.xml><?xml version="1.0" encoding="utf-8"?>
+<p:sld xmlns:a="http://schemas.openxmlformats.org/drawingml/2006/main" xmlns:r="http://schemas.openxmlformats.org/officeDocument/2006/relationships" xmlns:p="http://schemas.openxmlformats.org/presentationml/2006/main">
+  <p:cSld>
+    <p:spTree>
+      <p:nvGrpSpPr>
+        <p:cNvPr id="1" name=""/>
+        <p:cNvGrpSpPr/>
+        <p:nvPr/>
+      </p:nvGrpSpPr>
+      <p:grpSpPr>
+        <a:xfrm>
+          <a:off x="0" y="0"/>
+          <a:ext cx="0" cy="0"/>
+          <a:chOff x="0" y="0"/>
+          <a:chExt cx="0" cy="0"/>
+        </a:xfrm>
+      </p:grpSpPr>
+      <p:sp>
+        <p:nvSpPr>
+          <p:cNvPr id="4" name="Pravokotnik 3"/>
+          <p:cNvSpPr/>
+          <p:nvPr/>
+        </p:nvSpPr>
+        <p:spPr>
+          <a:xfrm>
+            <a:off x="0" y="0"/>
+            <a:ext cx="12192000" cy="6858000"/>
+          </a:xfrm>
+          <a:prstGeom prst="rect">
+            <a:avLst/>
+          </a:prstGeom>
+        </p:spPr>
+        <p:style>
+          <a:lnRef idx="2">
+            <a:schemeClr val="dk1">
+              <a:shade val="50000"/>
+            </a:schemeClr>
+          </a:lnRef>
+          <a:fillRef idx="1">
+            <a:schemeClr val="dk1"/>
+          </a:fillRef>
+          <a:effectRef idx="0">
+            <a:schemeClr val="dk1"/>
+          </a:effectRef>
+          <a:fontRef idx="minor">
+            <a:schemeClr val="lt1"/>
+          </a:fontRef>
+        </p:style>
+        <p:txBody>
+          <a:bodyPr rtlCol="0" anchor="ctr"/>
+          <a:lstStyle/>
+          <a:p>
+            <a:pPr algn="ctr"/>
+            <a:endParaRPr lang="en-GB" sz="4500" dirty="0"/>
+          </a:p>
+        </p:txBody>
+      </p:sp>
+      <p:sp>
+        <p:nvSpPr>
+          <p:cNvPr id="5" name="Pravokotnik 4"/>
+          <p:cNvSpPr/>
+          <p:nvPr/>
+        </p:nvSpPr>
+        <p:spPr>
+          <a:xfrm>
+            <a:off x="2693773" y="501477"/>
+            <a:ext cx="6804454" cy="1556952"/>
+          </a:xfrm>
+          <a:prstGeom prst="rect">
+            <a:avLst/>
+          </a:prstGeom>
+          <a:gradFill flip="none" rotWithShape="1">
+            <a:gsLst>
+              <a:gs pos="0">
+                <a:schemeClr val="accent5">
+                  <a:shade val="30000"/>
+                  <a:satMod val="115000"/>
+                </a:schemeClr>
+              </a:gs>
+              <a:gs pos="50000">
+                <a:schemeClr val="accent5">
+                  <a:shade val="67500"/>
+                  <a:satMod val="115000"/>
+                </a:schemeClr>
+              </a:gs>
+              <a:gs pos="100000">
+                <a:schemeClr val="accent5">
+                  <a:shade val="100000"/>
+                  <a:satMod val="115000"/>
+                </a:schemeClr>
+              </a:gs>
+            </a:gsLst>
+            <a:path path="circle">
+              <a:fillToRect l="50000" t="50000" r="50000" b="50000"/>
+            </a:path>
+            <a:tileRect/>
+          </a:gradFill>
+          <a:effectLst>
+            <a:glow rad="228600">
+              <a:schemeClr val="accent5">
+                <a:satMod val="175000"/>
+                <a:alpha val="40000"/>
+              </a:schemeClr>
+            </a:glow>
+          </a:effectLst>
+        </p:spPr>
+        <p:style>
+          <a:lnRef idx="2">
+            <a:schemeClr val="accent5">
+              <a:shade val="50000"/>
+            </a:schemeClr>
+          </a:lnRef>
+          <a:fillRef idx="1">
+            <a:schemeClr val="accent5"/>
+          </a:fillRef>
+          <a:effectRef idx="0">
+            <a:schemeClr val="accent5"/>
+          </a:effectRef>
+          <a:fontRef idx="minor">
+            <a:schemeClr val="lt1"/>
+          </a:fontRef>
+        </p:style>
+        <p:txBody>
+          <a:bodyPr rtlCol="0" anchor="ctr"/>
+          <a:lstStyle/>
+          <a:p>
+            <a:pPr algn="ctr"/>
+            <a:r>
+              <a:rPr lang="sl-SI" sz="4500" dirty="0" smtClean="0"/>
+              <a:t>NADALJUJ</a:t>
+            </a:r>
+            <a:endParaRPr lang="en-GB" sz="4500" dirty="0"/>
+          </a:p>
+        </p:txBody>
+      </p:sp>
+      <p:sp>
+        <p:nvSpPr>
+          <p:cNvPr id="6" name="Pravokotnik 5"/>
+          <p:cNvSpPr/>
+          <p:nvPr/>
+        </p:nvSpPr>
+        <p:spPr>
+          <a:xfrm>
+            <a:off x="2693773" y="2650524"/>
+            <a:ext cx="6804454" cy="1556952"/>
+          </a:xfrm>
+          <a:prstGeom prst="rect">
+            <a:avLst/>
+          </a:prstGeom>
+          <a:gradFill flip="none" rotWithShape="1">
+            <a:gsLst>
+              <a:gs pos="0">
+                <a:schemeClr val="accent5">
+                  <a:shade val="30000"/>
+                  <a:satMod val="115000"/>
+                </a:schemeClr>
+              </a:gs>
+              <a:gs pos="50000">
+                <a:schemeClr val="accent5">
+                  <a:shade val="67500"/>
+                  <a:satMod val="115000"/>
+                </a:schemeClr>
+              </a:gs>
+              <a:gs pos="100000">
+                <a:schemeClr val="accent5">
+                  <a:shade val="100000"/>
+                  <a:satMod val="115000"/>
+                </a:schemeClr>
+              </a:gs>
+            </a:gsLst>
+            <a:path path="circle">
+              <a:fillToRect l="50000" t="50000" r="50000" b="50000"/>
+            </a:path>
+            <a:tileRect/>
+          </a:gradFill>
+          <a:effectLst>
+            <a:glow rad="228600">
+              <a:schemeClr val="accent5">
+                <a:satMod val="175000"/>
+                <a:alpha val="40000"/>
+              </a:schemeClr>
+            </a:glow>
+          </a:effectLst>
+        </p:spPr>
+        <p:style>
+          <a:lnRef idx="2">
+            <a:schemeClr val="accent5">
+              <a:shade val="50000"/>
+            </a:schemeClr>
+          </a:lnRef>
+          <a:fillRef idx="1">
+            <a:schemeClr val="accent5"/>
+          </a:fillRef>
+          <a:effectRef idx="0">
+            <a:schemeClr val="accent5"/>
+          </a:effectRef>
+          <a:fontRef idx="minor">
+            <a:schemeClr val="lt1"/>
+          </a:fontRef>
+        </p:style>
+        <p:txBody>
+          <a:bodyPr rtlCol="0" anchor="ctr"/>
+          <a:lstStyle/>
+          <a:p>
+            <a:pPr algn="ctr"/>
+            <a:r>
+              <a:rPr lang="sl-SI" sz="4500" dirty="0" smtClean="0"/>
+              <a:t>NASTAVITVE</a:t>
+            </a:r>
+            <a:endParaRPr lang="en-GB" sz="4500" dirty="0"/>
+          </a:p>
+        </p:txBody>
+      </p:sp>
+      <p:sp>
+        <p:nvSpPr>
+          <p:cNvPr id="7" name="Pravokotnik 6"/>
+          <p:cNvSpPr/>
+          <p:nvPr/>
+        </p:nvSpPr>
+        <p:spPr>
+          <a:xfrm>
+            <a:off x="2693773" y="4754262"/>
+            <a:ext cx="6804454" cy="1556952"/>
+          </a:xfrm>
+          <a:prstGeom prst="rect">
+            <a:avLst/>
+          </a:prstGeom>
+          <a:gradFill flip="none" rotWithShape="1">
+            <a:gsLst>
+              <a:gs pos="0">
+                <a:schemeClr val="accent5">
+                  <a:shade val="30000"/>
+                  <a:satMod val="115000"/>
+                </a:schemeClr>
+              </a:gs>
+              <a:gs pos="50000">
+                <a:schemeClr val="accent5">
+                  <a:shade val="67500"/>
+                  <a:satMod val="115000"/>
+                </a:schemeClr>
+              </a:gs>
+              <a:gs pos="100000">
+                <a:schemeClr val="accent5">
+                  <a:shade val="100000"/>
+                  <a:satMod val="115000"/>
+                </a:schemeClr>
+              </a:gs>
+            </a:gsLst>
+            <a:path path="circle">
+              <a:fillToRect l="50000" t="50000" r="50000" b="50000"/>
+            </a:path>
+            <a:tileRect/>
+          </a:gradFill>
+          <a:effectLst>
+            <a:glow rad="228600">
+              <a:schemeClr val="accent5">
+                <a:satMod val="175000"/>
+                <a:alpha val="40000"/>
+              </a:schemeClr>
+            </a:glow>
+          </a:effectLst>
+        </p:spPr>
+        <p:style>
+          <a:lnRef idx="2">
+            <a:schemeClr val="accent5">
+              <a:shade val="50000"/>
+            </a:schemeClr>
+          </a:lnRef>
+          <a:fillRef idx="1">
+            <a:schemeClr val="accent5"/>
+          </a:fillRef>
+          <a:effectRef idx="0">
+            <a:schemeClr val="accent5"/>
+          </a:effectRef>
+          <a:fontRef idx="minor">
+            <a:schemeClr val="lt1"/>
+          </a:fontRef>
+        </p:style>
+        <p:txBody>
+          <a:bodyPr rtlCol="0" anchor="ctr"/>
+          <a:lstStyle/>
+          <a:p>
+            <a:pPr algn="ctr"/>
+            <a:r>
+              <a:rPr lang="sl-SI" sz="4500" dirty="0" smtClean="0"/>
+              <a:t>KONEC</a:t>
+            </a:r>
+            <a:endParaRPr lang="en-GB" sz="4500" dirty="0"/>
+          </a:p>
+        </p:txBody>
+      </p:sp>
+    </p:spTree>
+    <p:extLst>
+      <p:ext uri="{BB962C8B-B14F-4D97-AF65-F5344CB8AC3E}">
+        <p14:creationId xmlns:p14="http://schemas.microsoft.com/office/powerpoint/2010/main" val="4178646458"/>
+      </p:ext>
+    </p:extLst>
+  </p:cSld>
+  <p:clrMapOvr>
+    <a:masterClrMapping/>
+  </p:clrMapOvr>
+</p:sld>
+</file>
+
 <file path=ppt/theme/theme1.xml><?xml version="1.0" encoding="utf-8"?>
 <a:theme xmlns:a="http://schemas.openxmlformats.org/drawingml/2006/main" name="Officeova tema">
   <a:themeElements>

</xml_diff>

<commit_message>
added functionality for enableing and diseableing sound
</commit_message>
<xml_diff>
--- a/Predstavitev1.pptx
+++ b/Predstavitev1.pptx
@@ -10,6 +10,7 @@
     <p:sldId id="258" r:id="rId4"/>
     <p:sldId id="260" r:id="rId5"/>
     <p:sldId id="262" r:id="rId6"/>
+    <p:sldId id="263" r:id="rId7"/>
   </p:sldIdLst>
   <p:sldSz cx="12192000" cy="6858000"/>
   <p:notesSz cx="6858000" cy="9144000"/>
@@ -4622,6 +4623,154 @@
 </p:sld>
 </file>
 
+<file path=ppt/slides/slide6.xml><?xml version="1.0" encoding="utf-8"?>
+<p:sld xmlns:a="http://schemas.openxmlformats.org/drawingml/2006/main" xmlns:r="http://schemas.openxmlformats.org/officeDocument/2006/relationships" xmlns:p="http://schemas.openxmlformats.org/presentationml/2006/main">
+  <p:cSld>
+    <p:spTree>
+      <p:nvGrpSpPr>
+        <p:cNvPr id="1" name=""/>
+        <p:cNvGrpSpPr/>
+        <p:nvPr/>
+      </p:nvGrpSpPr>
+      <p:grpSpPr>
+        <a:xfrm>
+          <a:off x="0" y="0"/>
+          <a:ext cx="0" cy="0"/>
+          <a:chOff x="0" y="0"/>
+          <a:chExt cx="0" cy="0"/>
+        </a:xfrm>
+      </p:grpSpPr>
+      <p:sp>
+        <p:nvSpPr>
+          <p:cNvPr id="4" name="Pravokotnik 3"/>
+          <p:cNvSpPr/>
+          <p:nvPr/>
+        </p:nvSpPr>
+        <p:spPr>
+          <a:xfrm>
+            <a:off x="0" y="0"/>
+            <a:ext cx="12192000" cy="6858000"/>
+          </a:xfrm>
+          <a:prstGeom prst="rect">
+            <a:avLst/>
+          </a:prstGeom>
+        </p:spPr>
+        <p:style>
+          <a:lnRef idx="2">
+            <a:schemeClr val="dk1">
+              <a:shade val="50000"/>
+            </a:schemeClr>
+          </a:lnRef>
+          <a:fillRef idx="1">
+            <a:schemeClr val="dk1"/>
+          </a:fillRef>
+          <a:effectRef idx="0">
+            <a:schemeClr val="dk1"/>
+          </a:effectRef>
+          <a:fontRef idx="minor">
+            <a:schemeClr val="lt1"/>
+          </a:fontRef>
+        </p:style>
+        <p:txBody>
+          <a:bodyPr rtlCol="0" anchor="ctr"/>
+          <a:lstStyle/>
+          <a:p>
+            <a:pPr algn="ctr"/>
+            <a:endParaRPr lang="en-GB" sz="4500" dirty="0"/>
+          </a:p>
+        </p:txBody>
+      </p:sp>
+      <p:sp>
+        <p:nvSpPr>
+          <p:cNvPr id="7" name="Pravokotnik 6"/>
+          <p:cNvSpPr/>
+          <p:nvPr/>
+        </p:nvSpPr>
+        <p:spPr>
+          <a:xfrm>
+            <a:off x="2693773" y="4754262"/>
+            <a:ext cx="6804454" cy="1556952"/>
+          </a:xfrm>
+          <a:prstGeom prst="rect">
+            <a:avLst/>
+          </a:prstGeom>
+          <a:gradFill flip="none" rotWithShape="1">
+            <a:gsLst>
+              <a:gs pos="0">
+                <a:schemeClr val="accent5">
+                  <a:shade val="30000"/>
+                  <a:satMod val="115000"/>
+                </a:schemeClr>
+              </a:gs>
+              <a:gs pos="50000">
+                <a:schemeClr val="accent5">
+                  <a:shade val="67500"/>
+                  <a:satMod val="115000"/>
+                </a:schemeClr>
+              </a:gs>
+              <a:gs pos="100000">
+                <a:schemeClr val="accent5">
+                  <a:shade val="100000"/>
+                  <a:satMod val="115000"/>
+                </a:schemeClr>
+              </a:gs>
+            </a:gsLst>
+            <a:path path="circle">
+              <a:fillToRect l="50000" t="50000" r="50000" b="50000"/>
+            </a:path>
+            <a:tileRect/>
+          </a:gradFill>
+          <a:effectLst>
+            <a:glow rad="228600">
+              <a:schemeClr val="accent5">
+                <a:satMod val="175000"/>
+                <a:alpha val="40000"/>
+              </a:schemeClr>
+            </a:glow>
+          </a:effectLst>
+        </p:spPr>
+        <p:style>
+          <a:lnRef idx="2">
+            <a:schemeClr val="accent5">
+              <a:shade val="50000"/>
+            </a:schemeClr>
+          </a:lnRef>
+          <a:fillRef idx="1">
+            <a:schemeClr val="accent5"/>
+          </a:fillRef>
+          <a:effectRef idx="0">
+            <a:schemeClr val="accent5"/>
+          </a:effectRef>
+          <a:fontRef idx="minor">
+            <a:schemeClr val="lt1"/>
+          </a:fontRef>
+        </p:style>
+        <p:txBody>
+          <a:bodyPr rtlCol="0" anchor="ctr"/>
+          <a:lstStyle/>
+          <a:p>
+            <a:pPr algn="ctr"/>
+            <a:r>
+              <a:rPr lang="sl-SI" sz="4500" dirty="0" smtClean="0"/>
+              <a:t>BACK</a:t>
+            </a:r>
+            <a:endParaRPr lang="en-GB" sz="4500" dirty="0"/>
+          </a:p>
+        </p:txBody>
+      </p:sp>
+    </p:spTree>
+    <p:extLst>
+      <p:ext uri="{BB962C8B-B14F-4D97-AF65-F5344CB8AC3E}">
+        <p14:creationId xmlns:p14="http://schemas.microsoft.com/office/powerpoint/2010/main" val="300737183"/>
+      </p:ext>
+    </p:extLst>
+  </p:cSld>
+  <p:clrMapOvr>
+    <a:masterClrMapping/>
+  </p:clrMapOvr>
+</p:sld>
+</file>
+
 <file path=ppt/theme/theme1.xml><?xml version="1.0" encoding="utf-8"?>
 <a:theme xmlns:a="http://schemas.openxmlformats.org/drawingml/2006/main" name="Officeova tema">
   <a:themeElements>

</xml_diff>